<commit_message>
revised, Nationality and grammar
</commit_message>
<xml_diff>
--- a/project-1-nhl.pptx
+++ b/project-1-nhl.pptx
@@ -2436,8 +2436,8 @@
       </dsp:nvSpPr>
       <dsp:spPr>
         <a:xfrm>
-          <a:off x="0" y="2792381"/>
-          <a:ext cx="6245265" cy="1265610"/>
+          <a:off x="0" y="2791558"/>
+          <a:ext cx="6245265" cy="1295043"/>
         </a:xfrm>
         <a:prstGeom prst="roundRect">
           <a:avLst/>
@@ -2503,8 +2503,8 @@
         </a:p>
       </dsp:txBody>
       <dsp:txXfrm>
-        <a:off x="61782" y="2854163"/>
-        <a:ext cx="6121701" cy="1142046"/>
+        <a:off x="63219" y="2854777"/>
+        <a:ext cx="6118827" cy="1168605"/>
       </dsp:txXfrm>
     </dsp:sp>
     <dsp:sp modelId="{2314B425-D59F-44F7-BD49-FDBFA4C40818}">
@@ -2514,8 +2514,8 @@
       </dsp:nvSpPr>
       <dsp:spPr>
         <a:xfrm>
-          <a:off x="0" y="127874"/>
-          <a:ext cx="6245265" cy="1265610"/>
+          <a:off x="0" y="69008"/>
+          <a:ext cx="6245265" cy="1295043"/>
         </a:xfrm>
         <a:prstGeom prst="roundRect">
           <a:avLst/>
@@ -2581,8 +2581,8 @@
         </a:p>
       </dsp:txBody>
       <dsp:txXfrm>
-        <a:off x="61782" y="189656"/>
-        <a:ext cx="6121701" cy="1142046"/>
+        <a:off x="63219" y="132227"/>
+        <a:ext cx="6118827" cy="1168605"/>
       </dsp:txXfrm>
     </dsp:sp>
     <dsp:sp modelId="{128111EA-389C-49A2-B6CC-56FF56F54E11}">
@@ -2592,8 +2592,8 @@
       </dsp:nvSpPr>
       <dsp:spPr>
         <a:xfrm>
-          <a:off x="0" y="1439104"/>
-          <a:ext cx="6245265" cy="1265610"/>
+          <a:off x="0" y="1409671"/>
+          <a:ext cx="6245265" cy="1295043"/>
         </a:xfrm>
         <a:prstGeom prst="roundRect">
           <a:avLst/>
@@ -2659,8 +2659,8 @@
         </a:p>
       </dsp:txBody>
       <dsp:txXfrm>
-        <a:off x="61782" y="1500886"/>
-        <a:ext cx="6121701" cy="1142046"/>
+        <a:off x="63219" y="1472890"/>
+        <a:ext cx="6118827" cy="1168605"/>
       </dsp:txXfrm>
     </dsp:sp>
     <dsp:sp modelId="{79E292A9-84D8-4FC5-9382-5486B418C887}">
@@ -2670,8 +2670,8 @@
       </dsp:nvSpPr>
       <dsp:spPr>
         <a:xfrm>
-          <a:off x="0" y="4159644"/>
-          <a:ext cx="6245265" cy="1265610"/>
+          <a:off x="0" y="4189077"/>
+          <a:ext cx="6245265" cy="1295043"/>
         </a:xfrm>
         <a:prstGeom prst="roundRect">
           <a:avLst/>
@@ -2737,8 +2737,8 @@
         </a:p>
       </dsp:txBody>
       <dsp:txXfrm>
-        <a:off x="61782" y="4221426"/>
-        <a:ext cx="6121701" cy="1142046"/>
+        <a:off x="63219" y="4252296"/>
+        <a:ext cx="6118827" cy="1168605"/>
       </dsp:txXfrm>
     </dsp:sp>
   </dsp:spTree>
@@ -5865,7 +5865,7 @@
           <a:p>
             <a:fld id="{5EA28068-AFBD-4979-B752-9EB6F90B1386}" type="datetimeFigureOut">
               <a:rPr lang="en-US" smtClean="0"/>
-              <a:t>6/4/2023</a:t>
+              <a:t>6/5/2023</a:t>
             </a:fld>
             <a:endParaRPr lang="en-US" dirty="0"/>
           </a:p>
@@ -18326,8 +18326,8 @@
         </p:blipFill>
         <p:spPr>
           <a:xfrm>
-            <a:off x="1419225" y="1438275"/>
-            <a:ext cx="9201150" cy="4476750"/>
+            <a:off x="1419225" y="1283007"/>
+            <a:ext cx="9201150" cy="4246525"/>
           </a:xfrm>
           <a:prstGeom prst="rect">
             <a:avLst/>
@@ -18383,8 +18383,8 @@
         </p:nvSpPr>
         <p:spPr>
           <a:xfrm>
-            <a:off x="676275" y="5906611"/>
-            <a:ext cx="10477500" cy="1477328"/>
+            <a:off x="676275" y="5544303"/>
+            <a:ext cx="10477500" cy="1754326"/>
           </a:xfrm>
           <a:prstGeom prst="rect">
             <a:avLst/>
@@ -18403,7 +18403,7 @@
                 <a:effectLst/>
                 <a:latin typeface="var(--notebook-cell-output-font-family)"/>
               </a:rPr>
-              <a:t>Of the 2000+ entries, +2 to -2 is very dense. The winning team (blue) has a slightly above 0 stronger representation with an average +/- of slightly above 4 and the losing team at 2. When compare the two sets of values, the p-value supports that there is a very strong correlation between a more positive +/- and winning. </a:t>
+              <a:t>Of the 2000+ entries, +2 to -2 is very dense. The winning team (blue) has a slightly above 0 stronger representation with an average +/- of slightly above 4 and the losing team at 2. When comparing the two sets of values, the p-value supports that there is a very strong correlation between a more positive +/- and winning. </a:t>
             </a:r>
           </a:p>
           <a:p>
@@ -18819,7 +18819,17 @@
               <a:rPr lang="en-US" b="0" i="0" dirty="0">
                 <a:effectLst/>
               </a:rPr>
-              <a:t>When comparing the identified key stats for the season between the winning and losing team, it is apparent that the one stat with the most material difference and impact is the '+/-'.</a:t>
+              <a:t>When comparing the identified key stats for </a:t>
+            </a:r>
+            <a:r>
+              <a:rPr lang="en-US" dirty="0"/>
+              <a:t>all</a:t>
+            </a:r>
+            <a:r>
+              <a:rPr lang="en-US" b="0" i="0" dirty="0">
+                <a:effectLst/>
+              </a:rPr>
+              <a:t> seasons between the winning and losing team, it is apparent that the one statistic with the most material difference and impact is the '+/-'.</a:t>
             </a:r>
             <a:endParaRPr lang="en-US" dirty="0"/>
           </a:p>
@@ -25462,7 +25472,7 @@
                 <a:effectLst/>
                 <a:latin typeface="-apple-system"/>
               </a:rPr>
-              <a:t> Age, Penalty Infraction Minutes(PIM), Power Play Goals(PPG), Points(Pts), Plus/Minus(+/-), </a:t>
+              <a:t> Age, Nationality Penalty Infraction Minutes(PIM), Power Play Goals(PPG), Points(Pts), Plus/Minus(+/-), </a:t>
             </a:r>
             <a:r>
               <a:rPr lang="en-US" dirty="0">
@@ -27386,7 +27396,7 @@
               <a:rPr lang="en-US" b="0" i="0" dirty="0">
                 <a:effectLst/>
               </a:rPr>
-              <a:t>The Canadian player reduction in representation was most significant impacted in the decade of 2003-2012 and has remained consistent since.</a:t>
+              <a:t>The Canadian player reduction in representation was most significantly impacted in the decade of 2003-2012 and has remained consistent since.</a:t>
             </a:r>
             <a:endParaRPr lang="en-US" dirty="0"/>
           </a:p>
@@ -27932,21 +27942,21 @@
 </file>
 
 <file path=customXml/item1.xml><?xml version="1.0" encoding="utf-8"?>
+<p:properties xmlns:p="http://schemas.microsoft.com/office/2006/metadata/properties" xmlns:xsi="http://www.w3.org/2001/XMLSchema-instance" xmlns:pc="http://schemas.microsoft.com/office/infopath/2007/PartnerControls">
+  <documentManagement>
+    <Status xmlns="71af3243-3dd4-4a8d-8c0d-dd76da1f02a5">Not started</Status>
+    <MediaServiceKeyPoints xmlns="71af3243-3dd4-4a8d-8c0d-dd76da1f02a5" xsi:nil="true"/>
+  </documentManagement>
+</p:properties>
+</file>
+
+<file path=customXml/item2.xml><?xml version="1.0" encoding="utf-8"?>
 <?mso-contentType ?>
 <FormTemplates xmlns="http://schemas.microsoft.com/sharepoint/v3/contenttype/forms">
   <Display>DocumentLibraryForm</Display>
   <Edit>DocumentLibraryForm</Edit>
   <New>DocumentLibraryForm</New>
 </FormTemplates>
-</file>
-
-<file path=customXml/item2.xml><?xml version="1.0" encoding="utf-8"?>
-<p:properties xmlns:p="http://schemas.microsoft.com/office/2006/metadata/properties" xmlns:xsi="http://www.w3.org/2001/XMLSchema-instance" xmlns:pc="http://schemas.microsoft.com/office/infopath/2007/PartnerControls">
-  <documentManagement>
-    <Status xmlns="71af3243-3dd4-4a8d-8c0d-dd76da1f02a5">Not started</Status>
-    <MediaServiceKeyPoints xmlns="71af3243-3dd4-4a8d-8c0d-dd76da1f02a5" xsi:nil="true"/>
-  </documentManagement>
-</p:properties>
 </file>
 
 <file path=customXml/item3.xml><?xml version="1.0" encoding="utf-8"?>
@@ -28171,19 +28181,19 @@
 </file>
 
 <file path=customXml/itemProps1.xml><?xml version="1.0" encoding="utf-8"?>
-<ds:datastoreItem xmlns:ds="http://schemas.openxmlformats.org/officeDocument/2006/customXml" ds:itemID="{3C8E00D1-8EA3-4E42-801D-0253E1EAFC21}">
+<ds:datastoreItem xmlns:ds="http://schemas.openxmlformats.org/officeDocument/2006/customXml" ds:itemID="{99919F73-B6C2-4A43-95E2-833EC48925FE}">
   <ds:schemaRefs>
-    <ds:schemaRef ds:uri="http://schemas.microsoft.com/sharepoint/v3/contenttype/forms"/>
+    <ds:schemaRef ds:uri="http://schemas.microsoft.com/office/2006/metadata/properties"/>
+    <ds:schemaRef ds:uri="http://schemas.microsoft.com/office/infopath/2007/PartnerControls"/>
+    <ds:schemaRef ds:uri="71af3243-3dd4-4a8d-8c0d-dd76da1f02a5"/>
   </ds:schemaRefs>
 </ds:datastoreItem>
 </file>
 
 <file path=customXml/itemProps2.xml><?xml version="1.0" encoding="utf-8"?>
-<ds:datastoreItem xmlns:ds="http://schemas.openxmlformats.org/officeDocument/2006/customXml" ds:itemID="{99919F73-B6C2-4A43-95E2-833EC48925FE}">
+<ds:datastoreItem xmlns:ds="http://schemas.openxmlformats.org/officeDocument/2006/customXml" ds:itemID="{3C8E00D1-8EA3-4E42-801D-0253E1EAFC21}">
   <ds:schemaRefs>
-    <ds:schemaRef ds:uri="http://schemas.microsoft.com/office/2006/metadata/properties"/>
-    <ds:schemaRef ds:uri="http://schemas.microsoft.com/office/infopath/2007/PartnerControls"/>
-    <ds:schemaRef ds:uri="71af3243-3dd4-4a8d-8c0d-dd76da1f02a5"/>
+    <ds:schemaRef ds:uri="http://schemas.microsoft.com/sharepoint/v3/contenttype/forms"/>
   </ds:schemaRefs>
 </ds:datastoreItem>
 </file>

</xml_diff>

<commit_message>
added link to slide 6
</commit_message>
<xml_diff>
--- a/project-1-nhl.pptx
+++ b/project-1-nhl.pptx
@@ -24402,9 +24402,39 @@
           <a:p>
             <a:pPr lvl="1"/>
             <a:r>
+              <a:rPr lang="en-US" sz="1800" dirty="0">
+                <a:hlinkClick r:id="rId5"/>
+              </a:rPr>
+              <a:t>https://en.wikipedia.org/wiki/Ice_hockey_statistics#:~:text=Team%20statistics%20STK%20-%20winning%20or%20losing%20streak,tie%20%28Note%3A%20The%20NHL%20no%20longer%20uses%20ties</a:t>
+            </a:r>
+            <a:r>
               <a:rPr lang="en-US" sz="1800" dirty="0"/>
-              <a:t>https://en.wikipedia.org/wiki/Ice_hockey_statistics#:~:text=Team%20statistics%20STK%20-%20winning%20or%20losing%20streak,tie%20%28Note%3A%20The%20NHL%20no%20longer%20uses%20ties.</a:t>
+              <a:t>.</a:t>
             </a:r>
+          </a:p>
+          <a:p>
+            <a:pPr lvl="1"/>
+            <a:r>
+              <a:rPr lang="en-US" altLang="en-US" sz="1800" u="sng" dirty="0">
+                <a:solidFill>
+                  <a:srgbClr val="1D1C1D"/>
+                </a:solidFill>
+                <a:latin typeface="Monaco"/>
+                <a:hlinkClick r:id="rId6"/>
+              </a:rPr>
+              <a:t>https://en.wikipedia.org/wiki/List_of_Stanley_Cup_champions</a:t>
+            </a:r>
+            <a:r>
+              <a:rPr lang="en-US" altLang="en-US" sz="1600" dirty="0"/>
+              <a:t> </a:t>
+            </a:r>
+            <a:endParaRPr lang="en-US" altLang="en-US" sz="4400" dirty="0">
+              <a:latin typeface="Arial" panose="020B0604020202020204" pitchFamily="34" charset="0"/>
+            </a:endParaRPr>
+          </a:p>
+          <a:p>
+            <a:pPr lvl="1"/>
+            <a:endParaRPr lang="en-US" sz="1800" dirty="0"/>
           </a:p>
           <a:p>
             <a:pPr lvl="1"/>
@@ -25044,6 +25074,52 @@
                               <p:par>
                                 <p:cTn id="23" presetID="10" presetClass="entr" presetSubtype="0" fill="hold" grpId="0" nodeType="withEffect">
                                   <p:stCondLst>
+                                    <p:cond delay="1000"/>
+                                  </p:stCondLst>
+                                  <p:iterate type="wd">
+                                    <p:tmPct val="15000"/>
+                                  </p:iterate>
+                                  <p:childTnLst>
+                                    <p:set>
+                                      <p:cBhvr>
+                                        <p:cTn id="24" dur="1" fill="hold">
+                                          <p:stCondLst>
+                                            <p:cond delay="0"/>
+                                          </p:stCondLst>
+                                        </p:cTn>
+                                        <p:tgtEl>
+                                          <p:spTgt spid="8">
+                                            <p:txEl>
+                                              <p:pRg st="6" end="6"/>
+                                            </p:txEl>
+                                          </p:spTgt>
+                                        </p:tgtEl>
+                                        <p:attrNameLst>
+                                          <p:attrName>style.visibility</p:attrName>
+                                        </p:attrNameLst>
+                                      </p:cBhvr>
+                                      <p:to>
+                                        <p:strVal val="visible"/>
+                                      </p:to>
+                                    </p:set>
+                                    <p:animEffect transition="in" filter="fade">
+                                      <p:cBhvr>
+                                        <p:cTn id="25" dur="1000"/>
+                                        <p:tgtEl>
+                                          <p:spTgt spid="8">
+                                            <p:txEl>
+                                              <p:pRg st="6" end="6"/>
+                                            </p:txEl>
+                                          </p:spTgt>
+                                        </p:tgtEl>
+                                      </p:cBhvr>
+                                    </p:animEffect>
+                                  </p:childTnLst>
+                                </p:cTn>
+                              </p:par>
+                              <p:par>
+                                <p:cTn id="26" presetID="10" presetClass="entr" presetSubtype="0" fill="hold" grpId="0" nodeType="withEffect">
+                                  <p:stCondLst>
                                     <p:cond delay="500"/>
                                   </p:stCondLst>
                                   <p:iterate type="wd">
@@ -25052,7 +25128,7 @@
                                   <p:childTnLst>
                                     <p:set>
                                       <p:cBhvr>
-                                        <p:cTn id="24" dur="1" fill="hold">
+                                        <p:cTn id="27" dur="1" fill="hold">
                                           <p:stCondLst>
                                             <p:cond delay="0"/>
                                           </p:stCondLst>
@@ -25070,7 +25146,7 @@
                                     </p:set>
                                     <p:animEffect transition="in" filter="fade">
                                       <p:cBhvr>
-                                        <p:cTn id="25" dur="1000"/>
+                                        <p:cTn id="28" dur="1000"/>
                                         <p:tgtEl>
                                           <p:spTgt spid="2"/>
                                         </p:tgtEl>
@@ -26735,8 +26811,8 @@
         </p:nvSpPr>
         <p:spPr bwMode="auto">
           <a:xfrm>
-            <a:off x="2842672" y="5433725"/>
-            <a:ext cx="6506653" cy="861774"/>
+            <a:off x="2842672" y="5326003"/>
+            <a:ext cx="6506653" cy="1077218"/>
           </a:xfrm>
           <a:prstGeom prst="rect">
             <a:avLst/>
@@ -26779,6 +26855,53 @@
           </a:bodyPr>
           <a:lstStyle/>
           <a:p>
+            <a:pPr eaLnBrk="0" fontAlgn="base" hangingPunct="0">
+              <a:spcBef>
+                <a:spcPct val="0"/>
+              </a:spcBef>
+              <a:spcAft>
+                <a:spcPct val="0"/>
+              </a:spcAft>
+            </a:pPr>
+            <a:r>
+              <a:rPr kumimoji="0" lang="en-US" altLang="en-US" sz="1400" b="0" i="0" u="sng" strike="noStrike" cap="none" normalizeH="0" baseline="0" dirty="0">
+                <a:ln>
+                  <a:noFill/>
+                </a:ln>
+                <a:solidFill>
+                  <a:srgbClr val="1D1C1D"/>
+                </a:solidFill>
+                <a:effectLst/>
+                <a:latin typeface="Monaco"/>
+                <a:hlinkClick r:id="rId3"/>
+              </a:rPr>
+              <a:t>https://en.wikipedia.org/wiki/List_of_Stanley_Cup_champions</a:t>
+            </a:r>
+            <a:r>
+              <a:rPr kumimoji="0" lang="en-US" altLang="en-US" sz="1200" b="0" i="0" u="none" strike="noStrike" cap="none" normalizeH="0" baseline="0" dirty="0">
+                <a:ln>
+                  <a:noFill/>
+                </a:ln>
+                <a:solidFill>
+                  <a:schemeClr val="tx1"/>
+                </a:solidFill>
+                <a:effectLst/>
+              </a:rPr>
+              <a:t> </a:t>
+            </a:r>
+            <a:endParaRPr kumimoji="0" lang="en-US" altLang="en-US" sz="1400" b="0" i="0" u="none" strike="noStrike" cap="none" normalizeH="0" baseline="0" dirty="0">
+              <a:ln>
+                <a:noFill/>
+              </a:ln>
+              <a:solidFill>
+                <a:srgbClr val="1F2328"/>
+              </a:solidFill>
+              <a:effectLst/>
+              <a:latin typeface="ui-monospace"/>
+              <a:hlinkClick r:id="rId4"/>
+            </a:endParaRPr>
+          </a:p>
+          <a:p>
             <a:pPr marL="0" marR="0" lvl="0" indent="0" algn="l" defTabSz="914400" rtl="0" eaLnBrk="0" fontAlgn="base" latinLnBrk="0" hangingPunct="0">
               <a:lnSpc>
                 <a:spcPct val="100000"/>
@@ -26805,7 +26928,7 @@
                 </a:solidFill>
                 <a:effectLst/>
                 <a:latin typeface="ui-monospace"/>
-                <a:hlinkClick r:id="rId3"/>
+                <a:hlinkClick r:id="rId4"/>
               </a:rPr>
               <a:t>https://statsapi.web.nhl.com/api/v1/</a:t>
             </a:r>
@@ -26818,7 +26941,7 @@
                   <a:srgbClr val="1F2328"/>
                 </a:solidFill>
                 <a:effectLst/>
-                <a:hlinkClick r:id="rId3"/>
+                <a:hlinkClick r:id="rId4"/>
               </a:rPr>
               <a:t>teams</a:t>
             </a:r>
@@ -26851,7 +26974,7 @@
                 </a:solidFill>
                 <a:effectLst/>
                 <a:latin typeface="ui-monospace"/>
-                <a:hlinkClick r:id="rId4"/>
+                <a:hlinkClick r:id="rId5"/>
               </a:rPr>
               <a:t>https://statsapi.web.nhl.com/api/v1/team/&lt;ID&gt;?expand=team.roster&amp;season=&lt;seasom</a:t>
             </a:r>
@@ -26901,7 +27024,7 @@
                 <a:latin typeface="ui-monospace"/>
                 <a:ea typeface="+mn-ea"/>
                 <a:cs typeface="+mn-cs"/>
-                <a:hlinkClick r:id="rId5"/>
+                <a:hlinkClick r:id="rId6"/>
               </a:rPr>
               <a:t>https://statsapi.web.nhl.com/api/v1/people/&lt;ID</a:t>
             </a:r>
@@ -27942,21 +28065,21 @@
 </file>
 
 <file path=customXml/item1.xml><?xml version="1.0" encoding="utf-8"?>
+<?mso-contentType ?>
+<FormTemplates xmlns="http://schemas.microsoft.com/sharepoint/v3/contenttype/forms">
+  <Display>DocumentLibraryForm</Display>
+  <Edit>DocumentLibraryForm</Edit>
+  <New>DocumentLibraryForm</New>
+</FormTemplates>
+</file>
+
+<file path=customXml/item2.xml><?xml version="1.0" encoding="utf-8"?>
 <p:properties xmlns:p="http://schemas.microsoft.com/office/2006/metadata/properties" xmlns:xsi="http://www.w3.org/2001/XMLSchema-instance" xmlns:pc="http://schemas.microsoft.com/office/infopath/2007/PartnerControls">
   <documentManagement>
     <Status xmlns="71af3243-3dd4-4a8d-8c0d-dd76da1f02a5">Not started</Status>
     <MediaServiceKeyPoints xmlns="71af3243-3dd4-4a8d-8c0d-dd76da1f02a5" xsi:nil="true"/>
   </documentManagement>
 </p:properties>
-</file>
-
-<file path=customXml/item2.xml><?xml version="1.0" encoding="utf-8"?>
-<?mso-contentType ?>
-<FormTemplates xmlns="http://schemas.microsoft.com/sharepoint/v3/contenttype/forms">
-  <Display>DocumentLibraryForm</Display>
-  <Edit>DocumentLibraryForm</Edit>
-  <New>DocumentLibraryForm</New>
-</FormTemplates>
 </file>
 
 <file path=customXml/item3.xml><?xml version="1.0" encoding="utf-8"?>
@@ -28181,19 +28304,19 @@
 </file>
 
 <file path=customXml/itemProps1.xml><?xml version="1.0" encoding="utf-8"?>
+<ds:datastoreItem xmlns:ds="http://schemas.openxmlformats.org/officeDocument/2006/customXml" ds:itemID="{3C8E00D1-8EA3-4E42-801D-0253E1EAFC21}">
+  <ds:schemaRefs>
+    <ds:schemaRef ds:uri="http://schemas.microsoft.com/sharepoint/v3/contenttype/forms"/>
+  </ds:schemaRefs>
+</ds:datastoreItem>
+</file>
+
+<file path=customXml/itemProps2.xml><?xml version="1.0" encoding="utf-8"?>
 <ds:datastoreItem xmlns:ds="http://schemas.openxmlformats.org/officeDocument/2006/customXml" ds:itemID="{99919F73-B6C2-4A43-95E2-833EC48925FE}">
   <ds:schemaRefs>
     <ds:schemaRef ds:uri="http://schemas.microsoft.com/office/2006/metadata/properties"/>
     <ds:schemaRef ds:uri="http://schemas.microsoft.com/office/infopath/2007/PartnerControls"/>
     <ds:schemaRef ds:uri="71af3243-3dd4-4a8d-8c0d-dd76da1f02a5"/>
-  </ds:schemaRefs>
-</ds:datastoreItem>
-</file>
-
-<file path=customXml/itemProps2.xml><?xml version="1.0" encoding="utf-8"?>
-<ds:datastoreItem xmlns:ds="http://schemas.openxmlformats.org/officeDocument/2006/customXml" ds:itemID="{3C8E00D1-8EA3-4E42-801D-0253E1EAFC21}">
-  <ds:schemaRefs>
-    <ds:schemaRef ds:uri="http://schemas.microsoft.com/sharepoint/v3/contenttype/forms"/>
   </ds:schemaRefs>
 </ds:datastoreItem>
 </file>

</xml_diff>